<commit_message>
Update of ADO.Net exercises
Updated Microsoft.Data.SqlClient from v5.1 to v5.2
</commit_message>
<xml_diff>
--- a/Chap/ADONet/Presentations/ADONetEssentials.pptx
+++ b/Chap/ADONet/Presentations/ADONetEssentials.pptx
@@ -259,7 +259,7 @@
           <a:p>
             <a:fld id="{E15B7D8E-2A20-4C0E-991C-872DBB7459A8}" type="datetimeFigureOut">
               <a:rPr lang="da-DK" smtClean="0"/>
-              <a:t>26-03-2023</a:t>
+              <a:t>01-04-2024</a:t>
             </a:fld>
             <a:endParaRPr lang="da-DK"/>
           </a:p>
@@ -427,7 +427,7 @@
           <a:p>
             <a:fld id="{E15B7D8E-2A20-4C0E-991C-872DBB7459A8}" type="datetimeFigureOut">
               <a:rPr lang="da-DK" smtClean="0"/>
-              <a:t>26-03-2023</a:t>
+              <a:t>01-04-2024</a:t>
             </a:fld>
             <a:endParaRPr lang="da-DK"/>
           </a:p>
@@ -605,7 +605,7 @@
           <a:p>
             <a:fld id="{E15B7D8E-2A20-4C0E-991C-872DBB7459A8}" type="datetimeFigureOut">
               <a:rPr lang="da-DK" smtClean="0"/>
-              <a:t>26-03-2023</a:t>
+              <a:t>01-04-2024</a:t>
             </a:fld>
             <a:endParaRPr lang="da-DK"/>
           </a:p>
@@ -773,7 +773,7 @@
           <a:p>
             <a:fld id="{E15B7D8E-2A20-4C0E-991C-872DBB7459A8}" type="datetimeFigureOut">
               <a:rPr lang="da-DK" smtClean="0"/>
-              <a:t>26-03-2023</a:t>
+              <a:t>01-04-2024</a:t>
             </a:fld>
             <a:endParaRPr lang="da-DK"/>
           </a:p>
@@ -1018,7 +1018,7 @@
           <a:p>
             <a:fld id="{E15B7D8E-2A20-4C0E-991C-872DBB7459A8}" type="datetimeFigureOut">
               <a:rPr lang="da-DK" smtClean="0"/>
-              <a:t>26-03-2023</a:t>
+              <a:t>01-04-2024</a:t>
             </a:fld>
             <a:endParaRPr lang="da-DK"/>
           </a:p>
@@ -1247,7 +1247,7 @@
           <a:p>
             <a:fld id="{E15B7D8E-2A20-4C0E-991C-872DBB7459A8}" type="datetimeFigureOut">
               <a:rPr lang="da-DK" smtClean="0"/>
-              <a:t>26-03-2023</a:t>
+              <a:t>01-04-2024</a:t>
             </a:fld>
             <a:endParaRPr lang="da-DK"/>
           </a:p>
@@ -1611,7 +1611,7 @@
           <a:p>
             <a:fld id="{E15B7D8E-2A20-4C0E-991C-872DBB7459A8}" type="datetimeFigureOut">
               <a:rPr lang="da-DK" smtClean="0"/>
-              <a:t>26-03-2023</a:t>
+              <a:t>01-04-2024</a:t>
             </a:fld>
             <a:endParaRPr lang="da-DK"/>
           </a:p>
@@ -1728,7 +1728,7 @@
           <a:p>
             <a:fld id="{E15B7D8E-2A20-4C0E-991C-872DBB7459A8}" type="datetimeFigureOut">
               <a:rPr lang="da-DK" smtClean="0"/>
-              <a:t>26-03-2023</a:t>
+              <a:t>01-04-2024</a:t>
             </a:fld>
             <a:endParaRPr lang="da-DK"/>
           </a:p>
@@ -1823,7 +1823,7 @@
           <a:p>
             <a:fld id="{E15B7D8E-2A20-4C0E-991C-872DBB7459A8}" type="datetimeFigureOut">
               <a:rPr lang="da-DK" smtClean="0"/>
-              <a:t>26-03-2023</a:t>
+              <a:t>01-04-2024</a:t>
             </a:fld>
             <a:endParaRPr lang="da-DK"/>
           </a:p>
@@ -2098,7 +2098,7 @@
           <a:p>
             <a:fld id="{E15B7D8E-2A20-4C0E-991C-872DBB7459A8}" type="datetimeFigureOut">
               <a:rPr lang="da-DK" smtClean="0"/>
-              <a:t>26-03-2023</a:t>
+              <a:t>01-04-2024</a:t>
             </a:fld>
             <a:endParaRPr lang="da-DK"/>
           </a:p>
@@ -2350,7 +2350,7 @@
           <a:p>
             <a:fld id="{E15B7D8E-2A20-4C0E-991C-872DBB7459A8}" type="datetimeFigureOut">
               <a:rPr lang="da-DK" smtClean="0"/>
-              <a:t>26-03-2023</a:t>
+              <a:t>01-04-2024</a:t>
             </a:fld>
             <a:endParaRPr lang="da-DK"/>
           </a:p>
@@ -2561,7 +2561,7 @@
           <a:p>
             <a:fld id="{E15B7D8E-2A20-4C0E-991C-872DBB7459A8}" type="datetimeFigureOut">
               <a:rPr lang="da-DK" smtClean="0"/>
-              <a:t>26-03-2023</a:t>
+              <a:t>01-04-2024</a:t>
             </a:fld>
             <a:endParaRPr lang="da-DK"/>
           </a:p>
@@ -6697,28 +6697,10 @@
               <a:buNone/>
             </a:pPr>
             <a:r>
-              <a:rPr lang="da-DK" dirty="0">
-                <a:hlinkClick r:id="rId2"/>
-              </a:rPr>
-              <a:t>https://learn.microsoft.com/en-us/dotnet/api/microsoft</a:t>
-            </a:r>
-            <a:r>
               <a:rPr lang="da-DK">
                 <a:hlinkClick r:id="rId2"/>
               </a:rPr>
-              <a:t>.data</a:t>
-            </a:r>
-            <a:r>
-              <a:rPr lang="da-DK" dirty="0">
-                <a:hlinkClick r:id="rId2"/>
-              </a:rPr>
-              <a:t>.sqlclient?view</a:t>
-            </a:r>
-            <a:r>
-              <a:rPr lang="da-DK">
-                <a:hlinkClick r:id="rId2"/>
-              </a:rPr>
-              <a:t>=sqlclient-dotnet-core-5.1</a:t>
+              <a:t>https://learn.microsoft.com/en-us/dotnet/api/microsoft.data.sqlclient?view=sqlclient-dotnet-core-5.2</a:t>
             </a:r>
             <a:endParaRPr lang="da-DK"/>
           </a:p>

</xml_diff>